<commit_message>
DeveloporGuide - Fixed FindTagSequenceDiagram
</commit_message>
<xml_diff>
--- a/docs/diagrams/FindTagSequenceDiagram.pptx
+++ b/docs/diagrams/FindTagSequenceDiagram.pptx
@@ -10,7 +10,7 @@
   <p:sldIdLst>
     <p:sldId id="267" r:id="rId2"/>
   </p:sldIdLst>
-  <p:sldSz cx="9144000" cy="6858000" type="screen4x3"/>
+  <p:sldSz cx="12192000" cy="6858000"/>
   <p:notesSz cx="6858000" cy="9144000"/>
   <p:defaultTextStyle>
     <a:defPPr>
@@ -110,12 +110,12 @@
   <p:extLst>
     <p:ext uri="{EFAFB233-063F-42B5-8137-9DF3F51BA10A}">
       <p15:sldGuideLst xmlns:p15="http://schemas.microsoft.com/office/powerpoint/2012/main">
-        <p15:guide id="1" orient="horz" pos="1488">
+        <p15:guide id="1" orient="horz" pos="1488" userDrawn="1">
           <p15:clr>
             <a:srgbClr val="A4A3A4"/>
           </p15:clr>
         </p15:guide>
-        <p15:guide id="2" pos="2880">
+        <p15:guide id="2" pos="3840" userDrawn="1">
           <p15:clr>
             <a:srgbClr val="A4A3A4"/>
           </p15:clr>
@@ -226,8 +226,8 @@
         </p:nvSpPr>
         <p:spPr>
           <a:xfrm>
-            <a:off x="1143000" y="685800"/>
-            <a:ext cx="4572000" cy="3429000"/>
+            <a:off x="381000" y="685800"/>
+            <a:ext cx="6096000" cy="3429000"/>
           </a:xfrm>
           <a:prstGeom prst="rect">
             <a:avLst/>
@@ -504,8 +504,8 @@
         </p:nvSpPr>
         <p:spPr>
           <a:xfrm>
-            <a:off x="685800" y="2130425"/>
-            <a:ext cx="7772400" cy="1470025"/>
+            <a:off x="914400" y="2130426"/>
+            <a:ext cx="10363200" cy="1470025"/>
           </a:xfrm>
         </p:spPr>
         <p:txBody>
@@ -531,8 +531,8 @@
         </p:nvSpPr>
         <p:spPr>
           <a:xfrm>
-            <a:off x="1371600" y="3886200"/>
-            <a:ext cx="6400800" cy="1752600"/>
+            <a:off x="1828800" y="3886200"/>
+            <a:ext cx="8534400" cy="1752600"/>
           </a:xfrm>
         </p:spPr>
         <p:txBody>
@@ -912,8 +912,8 @@
         </p:nvSpPr>
         <p:spPr>
           <a:xfrm>
-            <a:off x="6629400" y="274638"/>
-            <a:ext cx="2057400" cy="5851525"/>
+            <a:off x="8839200" y="274639"/>
+            <a:ext cx="2743200" cy="5851525"/>
           </a:xfrm>
         </p:spPr>
         <p:txBody>
@@ -939,8 +939,8 @@
         </p:nvSpPr>
         <p:spPr>
           <a:xfrm>
-            <a:off x="457200" y="274638"/>
-            <a:ext cx="6019800" cy="5851525"/>
+            <a:off x="609600" y="274639"/>
+            <a:ext cx="8026400" cy="5851525"/>
           </a:xfrm>
         </p:spPr>
         <p:txBody>
@@ -1258,8 +1258,8 @@
         </p:nvSpPr>
         <p:spPr>
           <a:xfrm>
-            <a:off x="722313" y="4406900"/>
-            <a:ext cx="7772400" cy="1362075"/>
+            <a:off x="963084" y="4406901"/>
+            <a:ext cx="10363200" cy="1362075"/>
           </a:xfrm>
         </p:spPr>
         <p:txBody>
@@ -1289,8 +1289,8 @@
         </p:nvSpPr>
         <p:spPr>
           <a:xfrm>
-            <a:off x="722313" y="2906713"/>
-            <a:ext cx="7772400" cy="1500187"/>
+            <a:off x="963084" y="2906713"/>
+            <a:ext cx="10363200" cy="1500187"/>
           </a:xfrm>
         </p:spPr>
         <p:txBody>
@@ -1525,8 +1525,8 @@
         </p:nvSpPr>
         <p:spPr>
           <a:xfrm>
-            <a:off x="457200" y="1600200"/>
-            <a:ext cx="4038600" cy="4525963"/>
+            <a:off x="609600" y="1600201"/>
+            <a:ext cx="5384800" cy="4525963"/>
           </a:xfrm>
         </p:spPr>
         <p:txBody>
@@ -1609,8 +1609,8 @@
         </p:nvSpPr>
         <p:spPr>
           <a:xfrm>
-            <a:off x="4648200" y="1600200"/>
-            <a:ext cx="4038600" cy="4525963"/>
+            <a:off x="6197600" y="1600201"/>
+            <a:ext cx="5384800" cy="4525963"/>
           </a:xfrm>
         </p:spPr>
         <p:txBody>
@@ -1814,8 +1814,8 @@
         </p:nvSpPr>
         <p:spPr>
           <a:xfrm>
-            <a:off x="457200" y="1535113"/>
-            <a:ext cx="4040188" cy="639762"/>
+            <a:off x="609600" y="1535113"/>
+            <a:ext cx="5386917" cy="639762"/>
           </a:xfrm>
         </p:spPr>
         <p:txBody>
@@ -1879,8 +1879,8 @@
         </p:nvSpPr>
         <p:spPr>
           <a:xfrm>
-            <a:off x="457200" y="2174875"/>
-            <a:ext cx="4040188" cy="3951288"/>
+            <a:off x="609600" y="2174875"/>
+            <a:ext cx="5386917" cy="3951288"/>
           </a:xfrm>
         </p:spPr>
         <p:txBody>
@@ -1963,8 +1963,8 @@
         </p:nvSpPr>
         <p:spPr>
           <a:xfrm>
-            <a:off x="4645025" y="1535113"/>
-            <a:ext cx="4041775" cy="639762"/>
+            <a:off x="6193368" y="1535113"/>
+            <a:ext cx="5389033" cy="639762"/>
           </a:xfrm>
         </p:spPr>
         <p:txBody>
@@ -2028,8 +2028,8 @@
         </p:nvSpPr>
         <p:spPr>
           <a:xfrm>
-            <a:off x="4645025" y="2174875"/>
-            <a:ext cx="4041775" cy="3951288"/>
+            <a:off x="6193368" y="2174875"/>
+            <a:ext cx="5389033" cy="3951288"/>
           </a:xfrm>
         </p:spPr>
         <p:txBody>
@@ -2419,8 +2419,8 @@
         </p:nvSpPr>
         <p:spPr>
           <a:xfrm>
-            <a:off x="457200" y="273050"/>
-            <a:ext cx="3008313" cy="1162050"/>
+            <a:off x="609601" y="273050"/>
+            <a:ext cx="4011084" cy="1162050"/>
           </a:xfrm>
         </p:spPr>
         <p:txBody>
@@ -2450,8 +2450,8 @@
         </p:nvSpPr>
         <p:spPr>
           <a:xfrm>
-            <a:off x="3575050" y="273050"/>
-            <a:ext cx="5111750" cy="5853113"/>
+            <a:off x="4766733" y="273051"/>
+            <a:ext cx="6815667" cy="5853113"/>
           </a:xfrm>
         </p:spPr>
         <p:txBody>
@@ -2534,8 +2534,8 @@
         </p:nvSpPr>
         <p:spPr>
           <a:xfrm>
-            <a:off x="457200" y="1435100"/>
-            <a:ext cx="3008313" cy="4691063"/>
+            <a:off x="609601" y="1435101"/>
+            <a:ext cx="4011084" cy="4691063"/>
           </a:xfrm>
         </p:spPr>
         <p:txBody>
@@ -2694,8 +2694,8 @@
         </p:nvSpPr>
         <p:spPr>
           <a:xfrm>
-            <a:off x="1792288" y="4800600"/>
-            <a:ext cx="5486400" cy="566738"/>
+            <a:off x="2389717" y="4800600"/>
+            <a:ext cx="7315200" cy="566738"/>
           </a:xfrm>
         </p:spPr>
         <p:txBody>
@@ -2725,8 +2725,8 @@
         </p:nvSpPr>
         <p:spPr>
           <a:xfrm>
-            <a:off x="1792288" y="612775"/>
-            <a:ext cx="5486400" cy="4114800"/>
+            <a:off x="2389717" y="612775"/>
+            <a:ext cx="7315200" cy="4114800"/>
           </a:xfrm>
         </p:spPr>
         <p:txBody>
@@ -2786,8 +2786,8 @@
         </p:nvSpPr>
         <p:spPr>
           <a:xfrm>
-            <a:off x="1792288" y="5367338"/>
-            <a:ext cx="5486400" cy="804862"/>
+            <a:off x="2389717" y="5367338"/>
+            <a:ext cx="7315200" cy="804862"/>
           </a:xfrm>
         </p:spPr>
         <p:txBody>
@@ -2951,8 +2951,8 @@
         </p:nvSpPr>
         <p:spPr>
           <a:xfrm>
-            <a:off x="457200" y="274638"/>
-            <a:ext cx="8229600" cy="1143000"/>
+            <a:off x="609600" y="274638"/>
+            <a:ext cx="10972800" cy="1143000"/>
           </a:xfrm>
           <a:prstGeom prst="rect">
             <a:avLst/>
@@ -2983,8 +2983,8 @@
         </p:nvSpPr>
         <p:spPr>
           <a:xfrm>
-            <a:off x="457200" y="1600200"/>
-            <a:ext cx="8229600" cy="4525963"/>
+            <a:off x="609600" y="1600201"/>
+            <a:ext cx="10972800" cy="4525963"/>
           </a:xfrm>
           <a:prstGeom prst="rect">
             <a:avLst/>
@@ -3044,8 +3044,8 @@
         </p:nvSpPr>
         <p:spPr>
           <a:xfrm>
-            <a:off x="457200" y="6356350"/>
-            <a:ext cx="2133600" cy="365125"/>
+            <a:off x="609600" y="6356351"/>
+            <a:ext cx="2844800" cy="365125"/>
           </a:xfrm>
           <a:prstGeom prst="rect">
             <a:avLst/>
@@ -3085,8 +3085,8 @@
         </p:nvSpPr>
         <p:spPr>
           <a:xfrm>
-            <a:off x="3124200" y="6356350"/>
-            <a:ext cx="2895600" cy="365125"/>
+            <a:off x="4165600" y="6356351"/>
+            <a:ext cx="3860800" cy="365125"/>
           </a:xfrm>
           <a:prstGeom prst="rect">
             <a:avLst/>
@@ -3122,8 +3122,8 @@
         </p:nvSpPr>
         <p:spPr>
           <a:xfrm>
-            <a:off x="6553200" y="6356350"/>
-            <a:ext cx="2133600" cy="365125"/>
+            <a:off x="8737600" y="6356351"/>
+            <a:ext cx="2844800" cy="365125"/>
           </a:xfrm>
           <a:prstGeom prst="rect">
             <a:avLst/>
@@ -3450,7 +3450,7 @@
         </p:nvSpPr>
         <p:spPr>
           <a:xfrm>
-            <a:off x="723900" y="228600"/>
+            <a:off x="2247900" y="228600"/>
             <a:ext cx="9334500" cy="4343400"/>
           </a:xfrm>
           <a:prstGeom prst="roundRect">
@@ -3511,7 +3511,7 @@
         </p:nvSpPr>
         <p:spPr>
           <a:xfrm>
-            <a:off x="883145" y="543946"/>
+            <a:off x="2407146" y="543946"/>
             <a:ext cx="1455629" cy="346760"/>
           </a:xfrm>
           <a:prstGeom prst="rect">
@@ -3580,7 +3580,7 @@
         </p:nvCxnSpPr>
         <p:spPr>
           <a:xfrm>
-            <a:off x="1610959" y="907617"/>
+            <a:off x="3134959" y="907618"/>
             <a:ext cx="0" cy="3481399"/>
           </a:xfrm>
           <a:prstGeom prst="line">
@@ -3617,7 +3617,7 @@
         </p:nvSpPr>
         <p:spPr>
           <a:xfrm>
-            <a:off x="1538951" y="1258311"/>
+            <a:off x="3062951" y="1258312"/>
             <a:ext cx="152400" cy="2932689"/>
           </a:xfrm>
           <a:prstGeom prst="rect">
@@ -3664,7 +3664,7 @@
         </p:nvSpPr>
         <p:spPr>
           <a:xfrm>
-            <a:off x="3437188" y="423022"/>
+            <a:off x="4961188" y="423022"/>
             <a:ext cx="1219200" cy="467684"/>
           </a:xfrm>
           <a:prstGeom prst="rect">
@@ -3736,7 +3736,7 @@
         </p:nvCxnSpPr>
         <p:spPr>
           <a:xfrm>
-            <a:off x="4050587" y="907617"/>
+            <a:off x="5574587" y="907617"/>
             <a:ext cx="0" cy="1482984"/>
           </a:xfrm>
           <a:prstGeom prst="line">
@@ -3773,7 +3773,7 @@
         </p:nvSpPr>
         <p:spPr>
           <a:xfrm>
-            <a:off x="3978580" y="1365809"/>
+            <a:off x="5502580" y="1365810"/>
             <a:ext cx="154408" cy="829967"/>
           </a:xfrm>
           <a:prstGeom prst="rect">
@@ -3808,11 +3808,7 @@
           <a:lstStyle/>
           <a:p>
             <a:pPr algn="ctr"/>
-            <a:endParaRPr lang="en-SG" sz="1400">
-              <a:solidFill>
-                <a:schemeClr val="dk1"/>
-              </a:solidFill>
-            </a:endParaRPr>
+            <a:endParaRPr lang="en-SG" sz="1400"/>
           </a:p>
         </p:txBody>
       </p:sp>
@@ -3824,7 +3820,7 @@
         </p:nvCxnSpPr>
         <p:spPr>
           <a:xfrm>
-            <a:off x="419100" y="1261999"/>
+            <a:off x="1943101" y="1261999"/>
             <a:ext cx="1119851" cy="0"/>
           </a:xfrm>
           <a:prstGeom prst="straightConnector1">
@@ -3860,7 +3856,7 @@
         </p:nvSpPr>
         <p:spPr>
           <a:xfrm>
-            <a:off x="38100" y="990600"/>
+            <a:off x="1562100" y="990600"/>
             <a:ext cx="1424846" cy="215444"/>
           </a:xfrm>
           <a:prstGeom prst="rect">
@@ -3884,7 +3880,7 @@
               <a:t>execute</a:t>
             </a:r>
             <a:r>
-              <a:rPr lang="en-US" sz="1400" dirty="0" smtClean="0">
+              <a:rPr lang="en-US" sz="1400" dirty="0">
                 <a:solidFill>
                   <a:srgbClr val="0070C0"/>
                 </a:solidFill>
@@ -3892,7 +3888,7 @@
               <a:t>(“</a:t>
             </a:r>
             <a:r>
-              <a:rPr lang="en-US" sz="1400" dirty="0" err="1" smtClean="0">
+              <a:rPr lang="en-US" sz="1400" dirty="0" err="1">
                 <a:solidFill>
                   <a:srgbClr val="0070C0"/>
                 </a:solidFill>
@@ -3900,7 +3896,7 @@
               <a:t>findtag</a:t>
             </a:r>
             <a:r>
-              <a:rPr lang="en-US" sz="1400" dirty="0" smtClean="0">
+              <a:rPr lang="en-US" sz="1400" dirty="0">
                 <a:solidFill>
                   <a:srgbClr val="0070C0"/>
                 </a:solidFill>
@@ -3923,7 +3919,7 @@
         </p:nvCxnSpPr>
         <p:spPr>
           <a:xfrm flipV="1">
-            <a:off x="4135972" y="1512340"/>
+            <a:off x="5659972" y="1512341"/>
             <a:ext cx="922392" cy="1"/>
           </a:xfrm>
           <a:prstGeom prst="straightConnector1">
@@ -3959,7 +3955,7 @@
         </p:nvSpPr>
         <p:spPr>
           <a:xfrm>
-            <a:off x="3243421" y="2484071"/>
+            <a:off x="4767422" y="2484071"/>
             <a:ext cx="855809" cy="215444"/>
           </a:xfrm>
           <a:prstGeom prst="rect">
@@ -4001,7 +3997,7 @@
         </p:nvCxnSpPr>
         <p:spPr>
           <a:xfrm>
-            <a:off x="1691351" y="2209800"/>
+            <a:off x="3215352" y="2209800"/>
             <a:ext cx="2348067" cy="0"/>
           </a:xfrm>
           <a:prstGeom prst="straightConnector1">
@@ -4039,7 +4035,7 @@
         </p:nvCxnSpPr>
         <p:spPr>
           <a:xfrm>
-            <a:off x="380999" y="4191000"/>
+            <a:off x="1905000" y="4191000"/>
             <a:ext cx="1196051" cy="0"/>
           </a:xfrm>
           <a:prstGeom prst="straightConnector1">
@@ -4077,7 +4073,7 @@
         </p:nvSpPr>
         <p:spPr>
           <a:xfrm>
-            <a:off x="1885189" y="1106150"/>
+            <a:off x="3409190" y="1106150"/>
             <a:ext cx="1936993" cy="215444"/>
           </a:xfrm>
           <a:prstGeom prst="rect">
@@ -4107,15 +4103,15 @@
               <a:t>parseCommand</a:t>
             </a:r>
             <a:r>
-              <a:rPr lang="en-US" dirty="0" smtClean="0"/>
+              <a:rPr lang="en-US" dirty="0"/>
               <a:t>(“</a:t>
             </a:r>
             <a:r>
-              <a:rPr lang="en-US" dirty="0" err="1" smtClean="0"/>
+              <a:rPr lang="en-US" dirty="0" err="1"/>
               <a:t>findtag</a:t>
             </a:r>
             <a:r>
-              <a:rPr lang="en-US" dirty="0" smtClean="0"/>
+              <a:rPr lang="en-US" dirty="0"/>
               <a:t>”)</a:t>
             </a:r>
             <a:endParaRPr lang="en-US" dirty="0"/>
@@ -4130,7 +4126,7 @@
         </p:nvSpPr>
         <p:spPr>
           <a:xfrm>
-            <a:off x="3272755" y="3791076"/>
+            <a:off x="4796755" y="3791076"/>
             <a:ext cx="621216" cy="215444"/>
           </a:xfrm>
           <a:prstGeom prst="rect">
@@ -4170,7 +4166,7 @@
         </p:nvSpPr>
         <p:spPr>
           <a:xfrm>
-            <a:off x="645270" y="3945901"/>
+            <a:off x="2169270" y="3945901"/>
             <a:ext cx="762000" cy="215444"/>
           </a:xfrm>
           <a:prstGeom prst="rect">
@@ -4210,7 +4206,7 @@
         </p:nvSpPr>
         <p:spPr>
           <a:xfrm>
-            <a:off x="2724792" y="1994356"/>
+            <a:off x="4248793" y="1994356"/>
             <a:ext cx="220343" cy="215444"/>
           </a:xfrm>
           <a:prstGeom prst="rect">
@@ -4236,7 +4232,7 @@
           </a:lstStyle>
           <a:p>
             <a:r>
-              <a:rPr lang="en-US" dirty="0" err="1" smtClean="0"/>
+              <a:rPr lang="en-US" dirty="0" err="1"/>
               <a:t>ft</a:t>
             </a:r>
             <a:endParaRPr lang="en-US" dirty="0"/>
@@ -4248,7 +4244,7 @@
           <p:cNvPr id="66" name="Straight Arrow Connector 65">
             <a:extLst>
               <a:ext uri="{FF2B5EF4-FFF2-40B4-BE49-F238E27FC236}">
-                <a16:creationId xmlns:a16="http://schemas.microsoft.com/office/drawing/2014/main" xmlns="" id="{39916E2E-195A-4DC8-B025-B05FA87E6796}"/>
+                <a16:creationId xmlns="" xmlns:a16="http://schemas.microsoft.com/office/drawing/2014/main" id="{39916E2E-195A-4DC8-B025-B05FA87E6796}"/>
               </a:ext>
             </a:extLst>
           </p:cNvPr>
@@ -4259,7 +4255,7 @@
         </p:nvCxnSpPr>
         <p:spPr>
           <a:xfrm>
-            <a:off x="1691351" y="2731314"/>
+            <a:off x="3215352" y="2731315"/>
             <a:ext cx="5749349" cy="9359"/>
           </a:xfrm>
           <a:prstGeom prst="straightConnector1">
@@ -4292,7 +4288,7 @@
           <p:cNvPr id="67" name="Straight Arrow Connector 66">
             <a:extLst>
               <a:ext uri="{FF2B5EF4-FFF2-40B4-BE49-F238E27FC236}">
-                <a16:creationId xmlns:a16="http://schemas.microsoft.com/office/drawing/2014/main" xmlns="" id="{D881596E-177C-4FDC-8E60-CAB90B3D5FAB}"/>
+                <a16:creationId xmlns="" xmlns:a16="http://schemas.microsoft.com/office/drawing/2014/main" id="{D881596E-177C-4FDC-8E60-CAB90B3D5FAB}"/>
               </a:ext>
             </a:extLst>
           </p:cNvPr>
@@ -4303,7 +4299,7 @@
         </p:nvCxnSpPr>
         <p:spPr>
           <a:xfrm>
-            <a:off x="1708245" y="1363918"/>
+            <a:off x="3232246" y="1363919"/>
             <a:ext cx="2256705" cy="1"/>
           </a:xfrm>
           <a:prstGeom prst="straightConnector1">
@@ -4339,7 +4335,7 @@
         </p:nvSpPr>
         <p:spPr>
           <a:xfrm>
-            <a:off x="5793584" y="1295400"/>
+            <a:off x="7317584" y="1295400"/>
             <a:ext cx="154408" cy="381000"/>
           </a:xfrm>
           <a:prstGeom prst="rect">
@@ -4374,11 +4370,7 @@
           <a:lstStyle/>
           <a:p>
             <a:pPr algn="ctr"/>
-            <a:endParaRPr lang="en-SG" sz="1400">
-              <a:solidFill>
-                <a:schemeClr val="dk1"/>
-              </a:solidFill>
-            </a:endParaRPr>
+            <a:endParaRPr lang="en-SG" sz="1400"/>
           </a:p>
         </p:txBody>
       </p:sp>
@@ -4387,7 +4379,7 @@
           <p:cNvPr id="69" name="Straight Arrow Connector 68">
             <a:extLst>
               <a:ext uri="{FF2B5EF4-FFF2-40B4-BE49-F238E27FC236}">
-                <a16:creationId xmlns:a16="http://schemas.microsoft.com/office/drawing/2014/main" xmlns="" id="{7C9F21BC-13A9-471F-825A-2621FD36355F}"/>
+                <a16:creationId xmlns="" xmlns:a16="http://schemas.microsoft.com/office/drawing/2014/main" id="{7C9F21BC-13A9-471F-825A-2621FD36355F}"/>
               </a:ext>
             </a:extLst>
           </p:cNvPr>
@@ -4399,7 +4391,7 @@
         </p:nvCxnSpPr>
         <p:spPr>
           <a:xfrm flipV="1">
-            <a:off x="1691998" y="4006520"/>
+            <a:off x="3215998" y="4006520"/>
             <a:ext cx="5788664" cy="29942"/>
           </a:xfrm>
           <a:prstGeom prst="straightConnector1">
@@ -4434,7 +4426,7 @@
           <p:cNvPr id="41" name="Straight Arrow Connector 40">
             <a:extLst>
               <a:ext uri="{FF2B5EF4-FFF2-40B4-BE49-F238E27FC236}">
-                <a16:creationId xmlns:a16="http://schemas.microsoft.com/office/drawing/2014/main" xmlns="" id="{D881596E-177C-4FDC-8E60-CAB90B3D5FAB}"/>
+                <a16:creationId xmlns="" xmlns:a16="http://schemas.microsoft.com/office/drawing/2014/main" id="{D881596E-177C-4FDC-8E60-CAB90B3D5FAB}"/>
               </a:ext>
             </a:extLst>
           </p:cNvPr>
@@ -4445,7 +4437,7 @@
         </p:nvCxnSpPr>
         <p:spPr>
           <a:xfrm flipV="1">
-            <a:off x="5793584" y="1740024"/>
+            <a:off x="7317584" y="1740024"/>
             <a:ext cx="1091650" cy="12576"/>
           </a:xfrm>
           <a:prstGeom prst="straightConnector1">
@@ -4481,7 +4473,7 @@
         </p:nvSpPr>
         <p:spPr>
           <a:xfrm>
-            <a:off x="5035976" y="1062462"/>
+            <a:off x="6559976" y="1062462"/>
             <a:ext cx="1669624" cy="461538"/>
           </a:xfrm>
           <a:prstGeom prst="rect">
@@ -4517,7 +4509,7 @@
           <a:p>
             <a:pPr algn="ctr"/>
             <a:r>
-              <a:rPr lang="en-US" sz="1600" dirty="0" smtClean="0">
+              <a:rPr lang="en-US" sz="1600" dirty="0">
                 <a:solidFill>
                   <a:schemeClr val="bg1"/>
                 </a:solidFill>
@@ -4525,14 +4517,14 @@
               <a:t>:</a:t>
             </a:r>
             <a:r>
-              <a:rPr lang="en-US" sz="1600" dirty="0" err="1" smtClean="0">
+              <a:rPr lang="en-US" sz="1600" dirty="0" err="1">
                 <a:solidFill>
                   <a:schemeClr val="bg1"/>
                 </a:solidFill>
               </a:rPr>
               <a:t>FindTag</a:t>
             </a:r>
-            <a:endParaRPr lang="en-US" sz="1600" dirty="0" smtClean="0">
+            <a:endParaRPr lang="en-US" sz="1600" dirty="0">
               <a:solidFill>
                 <a:schemeClr val="bg1"/>
               </a:solidFill>
@@ -4541,7 +4533,7 @@
           <a:p>
             <a:pPr algn="ctr"/>
             <a:r>
-              <a:rPr lang="en-US" sz="1600" dirty="0" err="1" smtClean="0">
+              <a:rPr lang="en-US" sz="1600" dirty="0" err="1">
                 <a:solidFill>
                   <a:schemeClr val="bg1"/>
                 </a:solidFill>
@@ -4566,7 +4558,7 @@
         </p:nvCxnSpPr>
         <p:spPr>
           <a:xfrm>
-            <a:off x="4132988" y="1660264"/>
+            <a:off x="5656988" y="1660264"/>
             <a:ext cx="1778380" cy="0"/>
           </a:xfrm>
           <a:prstGeom prst="straightConnector1">
@@ -4606,7 +4598,7 @@
         </p:nvCxnSpPr>
         <p:spPr>
           <a:xfrm>
-            <a:off x="5867400" y="1656335"/>
+            <a:off x="7391400" y="1656335"/>
             <a:ext cx="0" cy="296178"/>
           </a:xfrm>
           <a:prstGeom prst="line">
@@ -4643,7 +4635,7 @@
         </p:nvSpPr>
         <p:spPr>
           <a:xfrm>
-            <a:off x="5793584" y="1752600"/>
+            <a:off x="7317584" y="1752600"/>
             <a:ext cx="154408" cy="381000"/>
           </a:xfrm>
           <a:prstGeom prst="rect">
@@ -4678,11 +4670,7 @@
           <a:lstStyle/>
           <a:p>
             <a:pPr algn="ctr"/>
-            <a:endParaRPr lang="en-SG" sz="1400">
-              <a:solidFill>
-                <a:schemeClr val="dk1"/>
-              </a:solidFill>
-            </a:endParaRPr>
+            <a:endParaRPr lang="en-SG" sz="1400"/>
           </a:p>
         </p:txBody>
       </p:sp>
@@ -4694,7 +4682,7 @@
         </p:nvSpPr>
         <p:spPr>
           <a:xfrm>
-            <a:off x="7391400" y="1676400"/>
+            <a:off x="8915400" y="1676400"/>
             <a:ext cx="154408" cy="381000"/>
           </a:xfrm>
           <a:prstGeom prst="rect">
@@ -4729,11 +4717,7 @@
           <a:lstStyle/>
           <a:p>
             <a:pPr algn="ctr"/>
-            <a:endParaRPr lang="en-SG" sz="1400">
-              <a:solidFill>
-                <a:schemeClr val="dk1"/>
-              </a:solidFill>
-            </a:endParaRPr>
+            <a:endParaRPr lang="en-SG" sz="1400"/>
           </a:p>
         </p:txBody>
       </p:sp>
@@ -4745,7 +4729,7 @@
         </p:nvSpPr>
         <p:spPr>
           <a:xfrm>
-            <a:off x="6858000" y="1295400"/>
+            <a:off x="8382000" y="1295400"/>
             <a:ext cx="1165400" cy="461538"/>
           </a:xfrm>
           <a:prstGeom prst="rect">
@@ -4789,14 +4773,14 @@
               <a:t>f</a:t>
             </a:r>
             <a:r>
-              <a:rPr lang="en-US" sz="1600" dirty="0" err="1" smtClean="0">
+              <a:rPr lang="en-US" sz="1600" dirty="0" err="1">
                 <a:solidFill>
                   <a:schemeClr val="bg1"/>
                 </a:solidFill>
               </a:rPr>
               <a:t>t:FindTag</a:t>
             </a:r>
-            <a:endParaRPr lang="en-US" sz="1600" dirty="0" smtClean="0">
+            <a:endParaRPr lang="en-US" sz="1600" dirty="0">
               <a:solidFill>
                 <a:schemeClr val="bg1"/>
               </a:solidFill>
@@ -4805,7 +4789,7 @@
           <a:p>
             <a:pPr algn="ctr"/>
             <a:r>
-              <a:rPr lang="en-US" sz="1600" dirty="0" smtClean="0">
+              <a:rPr lang="en-US" sz="1600" dirty="0">
                 <a:solidFill>
                   <a:schemeClr val="bg1"/>
                 </a:solidFill>
@@ -4828,7 +4812,7 @@
         </p:nvCxnSpPr>
         <p:spPr>
           <a:xfrm>
-            <a:off x="4144157" y="1754769"/>
+            <a:off x="5668157" y="1754770"/>
             <a:ext cx="1679276" cy="2171"/>
           </a:xfrm>
           <a:prstGeom prst="straightConnector1">
@@ -4864,7 +4848,7 @@
         </p:nvSpPr>
         <p:spPr>
           <a:xfrm>
-            <a:off x="4084065" y="1740024"/>
+            <a:off x="5608065" y="1740025"/>
             <a:ext cx="1389396" cy="169277"/>
           </a:xfrm>
           <a:prstGeom prst="rect">
@@ -4890,7 +4874,7 @@
           </a:lstStyle>
           <a:p>
             <a:r>
-              <a:rPr lang="en-US" sz="1100" dirty="0" smtClean="0"/>
+              <a:rPr lang="en-US" sz="1100" dirty="0"/>
               <a:t>parse(“friends”)</a:t>
             </a:r>
             <a:endParaRPr lang="en-US" sz="1100" dirty="0"/>
@@ -4907,7 +4891,7 @@
         </p:nvCxnSpPr>
         <p:spPr>
           <a:xfrm>
-            <a:off x="5947992" y="2041264"/>
+            <a:off x="7471992" y="2041264"/>
             <a:ext cx="1443408" cy="0"/>
           </a:xfrm>
           <a:prstGeom prst="straightConnector1">
@@ -4948,7 +4932,7 @@
         </p:nvCxnSpPr>
         <p:spPr>
           <a:xfrm>
-            <a:off x="4132988" y="2121237"/>
+            <a:off x="5656988" y="2121238"/>
             <a:ext cx="1737800" cy="12363"/>
           </a:xfrm>
           <a:prstGeom prst="straightConnector1">
@@ -4988,7 +4972,7 @@
         </p:nvCxnSpPr>
         <p:spPr>
           <a:xfrm>
-            <a:off x="5867400" y="2119576"/>
+            <a:off x="7391400" y="2119576"/>
             <a:ext cx="0" cy="152400"/>
           </a:xfrm>
           <a:prstGeom prst="line">
@@ -5025,7 +5009,7 @@
         </p:nvSpPr>
         <p:spPr>
           <a:xfrm>
-            <a:off x="5693198" y="2115235"/>
+            <a:off x="7217198" y="2115236"/>
             <a:ext cx="326602" cy="323165"/>
           </a:xfrm>
           <a:prstGeom prst="rect">
@@ -5041,11 +5025,8 @@
           <a:p>
             <a:pPr algn="ctr"/>
             <a:r>
-              <a:rPr lang="en-US" sz="1500" b="0" cap="none" spc="0" dirty="0" smtClean="0">
+              <a:rPr lang="en-US" sz="1500" dirty="0">
                 <a:ln w="0"/>
-                <a:solidFill>
-                  <a:schemeClr val="tx1"/>
-                </a:solidFill>
                 <a:effectLst>
                   <a:outerShdw blurRad="38100" dist="19050" dir="2700000" algn="tl" rotWithShape="0">
                     <a:schemeClr val="dk1">
@@ -5056,11 +5037,8 @@
               </a:rPr>
               <a:t>x</a:t>
             </a:r>
-            <a:endParaRPr lang="en-US" sz="1500" b="0" cap="none" spc="0" dirty="0">
+            <a:endParaRPr lang="en-US" sz="1500" dirty="0">
               <a:ln w="0"/>
-              <a:solidFill>
-                <a:schemeClr val="tx1"/>
-              </a:solidFill>
               <a:effectLst>
                 <a:outerShdw blurRad="38100" dist="19050" dir="2700000" algn="tl" rotWithShape="0">
                   <a:schemeClr val="dk1">
@@ -5080,7 +5058,7 @@
         </p:nvSpPr>
         <p:spPr>
           <a:xfrm>
-            <a:off x="7391400" y="2667000"/>
+            <a:off x="8915401" y="2667000"/>
             <a:ext cx="178523" cy="1339520"/>
           </a:xfrm>
           <a:prstGeom prst="rect">
@@ -5115,11 +5093,7 @@
           <a:lstStyle/>
           <a:p>
             <a:pPr algn="ctr"/>
-            <a:endParaRPr lang="en-SG" sz="1400">
-              <a:solidFill>
-                <a:schemeClr val="dk1"/>
-              </a:solidFill>
-            </a:endParaRPr>
+            <a:endParaRPr lang="en-SG" sz="1400"/>
           </a:p>
         </p:txBody>
       </p:sp>
@@ -5133,7 +5107,7 @@
         </p:nvCxnSpPr>
         <p:spPr>
           <a:xfrm>
-            <a:off x="7467600" y="1752600"/>
+            <a:off x="8991600" y="1752600"/>
             <a:ext cx="0" cy="2438400"/>
           </a:xfrm>
           <a:prstGeom prst="line">
@@ -5170,7 +5144,7 @@
         </p:nvSpPr>
         <p:spPr>
           <a:xfrm>
-            <a:off x="8839200" y="653831"/>
+            <a:off x="10363200" y="653831"/>
             <a:ext cx="937984" cy="346760"/>
           </a:xfrm>
           <a:prstGeom prst="rect">
@@ -5212,7 +5186,7 @@
           <a:p>
             <a:pPr algn="ctr"/>
             <a:r>
-              <a:rPr lang="en-US" sz="1600" dirty="0" smtClean="0">
+              <a:rPr lang="en-US" sz="1600" dirty="0">
                 <a:solidFill>
                   <a:schemeClr val="bg1"/>
                 </a:solidFill>
@@ -5235,7 +5209,7 @@
         </p:nvCxnSpPr>
         <p:spPr>
           <a:xfrm flipV="1">
-            <a:off x="7569923" y="2731314"/>
+            <a:off x="9093924" y="2731315"/>
             <a:ext cx="1659255" cy="9359"/>
           </a:xfrm>
           <a:prstGeom prst="straightConnector1">
@@ -5271,7 +5245,7 @@
         </p:nvSpPr>
         <p:spPr>
           <a:xfrm>
-            <a:off x="9229178" y="2731314"/>
+            <a:off x="10740382" y="2719872"/>
             <a:ext cx="156218" cy="246276"/>
           </a:xfrm>
           <a:prstGeom prst="rect">
@@ -5312,11 +5286,7 @@
           <a:lstStyle/>
           <a:p>
             <a:pPr algn="ctr"/>
-            <a:endParaRPr lang="en-SG" sz="1400">
-              <a:solidFill>
-                <a:schemeClr val="dk1"/>
-              </a:solidFill>
-            </a:endParaRPr>
+            <a:endParaRPr lang="en-SG" sz="1400"/>
           </a:p>
         </p:txBody>
       </p:sp>
@@ -5325,13 +5295,12 @@
           <p:cNvPr id="77" name="Straight Connector 76"/>
           <p:cNvCxnSpPr>
             <a:cxnSpLocks/>
-            <a:stCxn id="71" idx="2"/>
           </p:cNvCxnSpPr>
           <p:nvPr/>
         </p:nvCxnSpPr>
         <p:spPr>
           <a:xfrm>
-            <a:off x="9308192" y="1000591"/>
+            <a:off x="10820400" y="990600"/>
             <a:ext cx="0" cy="3160754"/>
           </a:xfrm>
           <a:prstGeom prst="line">
@@ -5371,7 +5340,7 @@
         </p:nvSpPr>
         <p:spPr>
           <a:xfrm>
-            <a:off x="7692746" y="2429513"/>
+            <a:off x="9216746" y="2429514"/>
             <a:ext cx="1389396" cy="276999"/>
           </a:xfrm>
           <a:prstGeom prst="rect">
@@ -5397,7 +5366,7 @@
           </a:lstStyle>
           <a:p>
             <a:r>
-              <a:rPr lang="en-US" sz="900" dirty="0" err="1" smtClean="0">
+              <a:rPr lang="en-US" sz="900" dirty="0" err="1">
                 <a:solidFill>
                   <a:schemeClr val="accent4">
                     <a:lumMod val="75000"/>
@@ -5406,7 +5375,7 @@
               </a:rPr>
               <a:t>updateFilterdPersonList</a:t>
             </a:r>
-            <a:endParaRPr lang="en-US" sz="900" dirty="0" smtClean="0">
+            <a:endParaRPr lang="en-US" sz="900" dirty="0">
               <a:solidFill>
                 <a:schemeClr val="accent4">
                   <a:lumMod val="75000"/>
@@ -5416,7 +5385,7 @@
           </a:p>
           <a:p>
             <a:r>
-              <a:rPr lang="en-US" sz="900" dirty="0" smtClean="0">
+              <a:rPr lang="en-US" sz="900" dirty="0">
                 <a:solidFill>
                   <a:schemeClr val="accent4">
                     <a:lumMod val="75000"/>
@@ -5445,7 +5414,7 @@
         </p:nvCxnSpPr>
         <p:spPr>
           <a:xfrm>
-            <a:off x="7545808" y="2977590"/>
+            <a:off x="9069808" y="2977590"/>
             <a:ext cx="1683370" cy="0"/>
           </a:xfrm>
           <a:prstGeom prst="straightConnector1">
@@ -5486,7 +5455,7 @@
         </p:nvCxnSpPr>
         <p:spPr>
           <a:xfrm flipV="1">
-            <a:off x="7467600" y="3255137"/>
+            <a:off x="8991600" y="3255138"/>
             <a:ext cx="555800" cy="1"/>
           </a:xfrm>
           <a:prstGeom prst="straightConnector1">
@@ -5522,7 +5491,7 @@
         </p:nvSpPr>
         <p:spPr>
           <a:xfrm>
-            <a:off x="8549085" y="3581400"/>
+            <a:off x="10073085" y="3581400"/>
             <a:ext cx="154408" cy="381000"/>
           </a:xfrm>
           <a:prstGeom prst="rect">
@@ -5557,11 +5526,7 @@
           <a:lstStyle/>
           <a:p>
             <a:pPr algn="ctr"/>
-            <a:endParaRPr lang="en-SG" sz="1400">
-              <a:solidFill>
-                <a:schemeClr val="dk1"/>
-              </a:solidFill>
-            </a:endParaRPr>
+            <a:endParaRPr lang="en-SG" sz="1400"/>
           </a:p>
         </p:txBody>
       </p:sp>
@@ -5573,7 +5538,7 @@
         </p:nvSpPr>
         <p:spPr>
           <a:xfrm>
-            <a:off x="8023400" y="3200981"/>
+            <a:off x="9547400" y="3200981"/>
             <a:ext cx="1205778" cy="461538"/>
           </a:xfrm>
           <a:prstGeom prst="rect">
@@ -5617,7 +5582,7 @@
               <a:t>r</a:t>
             </a:r>
             <a:r>
-              <a:rPr lang="en-US" sz="1200" dirty="0" smtClean="0">
+              <a:rPr lang="en-US" sz="1200" dirty="0">
                 <a:solidFill>
                   <a:schemeClr val="bg1"/>
                 </a:solidFill>
@@ -5628,20 +5593,12 @@
           <a:p>
             <a:pPr algn="ctr"/>
             <a:r>
-              <a:rPr lang="en-US" sz="1200" dirty="0" err="1" smtClean="0">
+              <a:rPr lang="en-US" sz="1200" dirty="0" err="1">
                 <a:solidFill>
                   <a:schemeClr val="bg1"/>
                 </a:solidFill>
               </a:rPr>
-              <a:t>Command</a:t>
-            </a:r>
-            <a:r>
-              <a:rPr lang="en-US" sz="1200" dirty="0" err="1" smtClean="0">
-                <a:solidFill>
-                  <a:schemeClr val="bg1"/>
-                </a:solidFill>
-              </a:rPr>
-              <a:t>Result</a:t>
+              <a:t>CommandResult</a:t>
             </a:r>
             <a:endParaRPr lang="en-SG" sz="1200" dirty="0">
               <a:solidFill>
@@ -5661,7 +5618,7 @@
         </p:nvCxnSpPr>
         <p:spPr>
           <a:xfrm>
-            <a:off x="7569923" y="3945427"/>
+            <a:off x="9093923" y="3945427"/>
             <a:ext cx="1133570" cy="0"/>
           </a:xfrm>
           <a:prstGeom prst="straightConnector1">
@@ -5701,6 +5658,13 @@
   <p:clrMapOvr>
     <a:masterClrMapping/>
   </p:clrMapOvr>
+  <p:timing>
+    <p:tnLst>
+      <p:par>
+        <p:cTn id="1" dur="indefinite" restart="never" nodeType="tmRoot"/>
+      </p:par>
+    </p:tnLst>
+  </p:timing>
 </p:sld>
 </file>
 

</xml_diff>